<commit_message>
commiting changes to powerpoint presentation for unit 6
</commit_message>
<xml_diff>
--- a/BIG MOUNTAIN RESORT – PRICING STRATEGY.pptx
+++ b/BIG MOUNTAIN RESORT – PRICING STRATEGY.pptx
@@ -9,7 +9,9 @@
     <p:sldId id="257" r:id="rId3"/>
     <p:sldId id="258" r:id="rId4"/>
     <p:sldId id="259" r:id="rId5"/>
-    <p:sldId id="260" r:id="rId6"/>
+    <p:sldId id="261" r:id="rId6"/>
+    <p:sldId id="262" r:id="rId7"/>
+    <p:sldId id="260" r:id="rId8"/>
   </p:sldIdLst>
   <p:sldSz cx="12192000" cy="6858000"/>
   <p:notesSz cx="6858000" cy="9144000"/>
@@ -108,6 +110,11 @@
       </a:defRPr>
     </a:lvl9pPr>
   </p:defaultTextStyle>
+  <p:extLst>
+    <p:ext uri="{EFAFB233-063F-42B5-8137-9DF3F51BA10A}">
+      <p15:sldGuideLst xmlns:p15="http://schemas.microsoft.com/office/powerpoint/2012/main"/>
+    </p:ext>
+  </p:extLst>
 </p:presentation>
 </file>
 
@@ -260,7 +267,7 @@
           <a:p>
             <a:fld id="{CE84D6D1-9986-44EF-955D-218DE02C0CCB}" type="datetimeFigureOut">
               <a:rPr lang="en-ZA" smtClean="0"/>
-              <a:t>2022/04/08</a:t>
+              <a:t>2022/04/17</a:t>
             </a:fld>
             <a:endParaRPr lang="en-ZA"/>
           </a:p>
@@ -460,7 +467,7 @@
           <a:p>
             <a:fld id="{CE84D6D1-9986-44EF-955D-218DE02C0CCB}" type="datetimeFigureOut">
               <a:rPr lang="en-ZA" smtClean="0"/>
-              <a:t>2022/04/08</a:t>
+              <a:t>2022/04/17</a:t>
             </a:fld>
             <a:endParaRPr lang="en-ZA"/>
           </a:p>
@@ -670,7 +677,7 @@
           <a:p>
             <a:fld id="{CE84D6D1-9986-44EF-955D-218DE02C0CCB}" type="datetimeFigureOut">
               <a:rPr lang="en-ZA" smtClean="0"/>
-              <a:t>2022/04/08</a:t>
+              <a:t>2022/04/17</a:t>
             </a:fld>
             <a:endParaRPr lang="en-ZA"/>
           </a:p>
@@ -870,7 +877,7 @@
           <a:p>
             <a:fld id="{CE84D6D1-9986-44EF-955D-218DE02C0CCB}" type="datetimeFigureOut">
               <a:rPr lang="en-ZA" smtClean="0"/>
-              <a:t>2022/04/08</a:t>
+              <a:t>2022/04/17</a:t>
             </a:fld>
             <a:endParaRPr lang="en-ZA"/>
           </a:p>
@@ -1146,7 +1153,7 @@
           <a:p>
             <a:fld id="{CE84D6D1-9986-44EF-955D-218DE02C0CCB}" type="datetimeFigureOut">
               <a:rPr lang="en-ZA" smtClean="0"/>
-              <a:t>2022/04/08</a:t>
+              <a:t>2022/04/17</a:t>
             </a:fld>
             <a:endParaRPr lang="en-ZA"/>
           </a:p>
@@ -1414,7 +1421,7 @@
           <a:p>
             <a:fld id="{CE84D6D1-9986-44EF-955D-218DE02C0CCB}" type="datetimeFigureOut">
               <a:rPr lang="en-ZA" smtClean="0"/>
-              <a:t>2022/04/08</a:t>
+              <a:t>2022/04/17</a:t>
             </a:fld>
             <a:endParaRPr lang="en-ZA"/>
           </a:p>
@@ -1829,7 +1836,7 @@
           <a:p>
             <a:fld id="{CE84D6D1-9986-44EF-955D-218DE02C0CCB}" type="datetimeFigureOut">
               <a:rPr lang="en-ZA" smtClean="0"/>
-              <a:t>2022/04/08</a:t>
+              <a:t>2022/04/17</a:t>
             </a:fld>
             <a:endParaRPr lang="en-ZA"/>
           </a:p>
@@ -1971,7 +1978,7 @@
           <a:p>
             <a:fld id="{CE84D6D1-9986-44EF-955D-218DE02C0CCB}" type="datetimeFigureOut">
               <a:rPr lang="en-ZA" smtClean="0"/>
-              <a:t>2022/04/08</a:t>
+              <a:t>2022/04/17</a:t>
             </a:fld>
             <a:endParaRPr lang="en-ZA"/>
           </a:p>
@@ -2084,7 +2091,7 @@
           <a:p>
             <a:fld id="{CE84D6D1-9986-44EF-955D-218DE02C0CCB}" type="datetimeFigureOut">
               <a:rPr lang="en-ZA" smtClean="0"/>
-              <a:t>2022/04/08</a:t>
+              <a:t>2022/04/17</a:t>
             </a:fld>
             <a:endParaRPr lang="en-ZA"/>
           </a:p>
@@ -2397,7 +2404,7 @@
           <a:p>
             <a:fld id="{CE84D6D1-9986-44EF-955D-218DE02C0CCB}" type="datetimeFigureOut">
               <a:rPr lang="en-ZA" smtClean="0"/>
-              <a:t>2022/04/08</a:t>
+              <a:t>2022/04/17</a:t>
             </a:fld>
             <a:endParaRPr lang="en-ZA"/>
           </a:p>
@@ -2686,7 +2693,7 @@
           <a:p>
             <a:fld id="{CE84D6D1-9986-44EF-955D-218DE02C0CCB}" type="datetimeFigureOut">
               <a:rPr lang="en-ZA" smtClean="0"/>
-              <a:t>2022/04/08</a:t>
+              <a:t>2022/04/17</a:t>
             </a:fld>
             <a:endParaRPr lang="en-ZA"/>
           </a:p>
@@ -2929,7 +2936,7 @@
           <a:p>
             <a:fld id="{CE84D6D1-9986-44EF-955D-218DE02C0CCB}" type="datetimeFigureOut">
               <a:rPr lang="en-ZA" smtClean="0"/>
-              <a:t>2022/04/08</a:t>
+              <a:t>2022/04/17</a:t>
             </a:fld>
             <a:endParaRPr lang="en-ZA"/>
           </a:p>
@@ -3608,7 +3615,7 @@
           <a:p>
             <a:r>
               <a:rPr lang="en-GB" dirty="0"/>
-              <a:t>The linear regression model that was used was able to out perform the original model by a significant margin.</a:t>
+              <a:t>The linear regression model that was used, was able to out perform the original model by a significant margin.</a:t>
             </a:r>
           </a:p>
           <a:p>
@@ -3700,7 +3707,31 @@
           <a:bodyPr/>
           <a:lstStyle/>
           <a:p>
-            <a:endParaRPr lang="en-ZA"/>
+            <a:r>
+              <a:rPr lang="en-GB" dirty="0"/>
+              <a:t>Two types of Linear Regression Models were used in the analysis. These are the simple linear regression model and the random forest linear regression model.</a:t>
+            </a:r>
+          </a:p>
+          <a:p>
+            <a:r>
+              <a:rPr lang="en-GB" dirty="0"/>
+              <a:t>The simple linear regression model had a mean absolute error of 11.79.</a:t>
+            </a:r>
+          </a:p>
+          <a:p>
+            <a:r>
+              <a:rPr lang="en-GB" dirty="0"/>
+              <a:t>The random forest linear regression model had the best performance with a mean absolute error of 9.54 on a test set derived from cross-validation.</a:t>
+            </a:r>
+          </a:p>
+          <a:p>
+            <a:r>
+              <a:rPr lang="en-ZA" dirty="0"/>
+              <a:t>There was a standard deviation of about 1.35.</a:t>
+            </a:r>
+          </a:p>
+          <a:p>
+            <a:endParaRPr lang="en-GB" dirty="0"/>
           </a:p>
         </p:txBody>
       </p:sp>
@@ -3739,6 +3770,208 @@
           <p:cNvPr id="2" name="Title 1">
             <a:extLst>
               <a:ext uri="{FF2B5EF4-FFF2-40B4-BE49-F238E27FC236}">
+                <a16:creationId xmlns:a16="http://schemas.microsoft.com/office/drawing/2014/main" id="{FBF056C1-CFFC-49AF-AC57-850FAC70A57E}"/>
+              </a:ext>
+            </a:extLst>
+          </p:cNvPr>
+          <p:cNvSpPr>
+            <a:spLocks noGrp="1"/>
+          </p:cNvSpPr>
+          <p:nvPr>
+            <p:ph type="title"/>
+          </p:nvPr>
+        </p:nvSpPr>
+        <p:spPr/>
+        <p:txBody>
+          <a:bodyPr/>
+          <a:lstStyle/>
+          <a:p>
+            <a:r>
+              <a:rPr lang="en-GB" dirty="0"/>
+              <a:t>Modelling Results and Analysis</a:t>
+            </a:r>
+            <a:endParaRPr lang="en-ZA" dirty="0"/>
+          </a:p>
+        </p:txBody>
+      </p:sp>
+      <p:sp>
+        <p:nvSpPr>
+          <p:cNvPr id="3" name="Content Placeholder 2">
+            <a:extLst>
+              <a:ext uri="{FF2B5EF4-FFF2-40B4-BE49-F238E27FC236}">
+                <a16:creationId xmlns:a16="http://schemas.microsoft.com/office/drawing/2014/main" id="{05318996-465F-424E-B510-3E5EFCAA0C23}"/>
+              </a:ext>
+            </a:extLst>
+          </p:cNvPr>
+          <p:cNvSpPr>
+            <a:spLocks noGrp="1"/>
+          </p:cNvSpPr>
+          <p:nvPr>
+            <p:ph idx="1"/>
+          </p:nvPr>
+        </p:nvSpPr>
+        <p:spPr/>
+        <p:txBody>
+          <a:bodyPr>
+            <a:normAutofit/>
+          </a:bodyPr>
+          <a:lstStyle/>
+          <a:p>
+            <a:r>
+              <a:rPr lang="en-GB" dirty="0"/>
+              <a:t>A number of scenarios were made after the model had been trained and tested. They are the following:</a:t>
+            </a:r>
+          </a:p>
+          <a:p>
+            <a:r>
+              <a:rPr lang="en-GB" dirty="0"/>
+              <a:t>Closing 10 of the least popular runs</a:t>
+            </a:r>
+          </a:p>
+          <a:p>
+            <a:r>
+              <a:rPr lang="en-GB" dirty="0"/>
+              <a:t>Increase the vertical drop by adding a run to a point 150 feet lower down but requiring the installation of an additional chair lift to bring skiers back up, without additional snow making coverage</a:t>
+            </a:r>
+          </a:p>
+          <a:p>
+            <a:r>
+              <a:rPr lang="en-GB" dirty="0"/>
+              <a:t>adding 2 acres of snow making cover after doing the above.</a:t>
+            </a:r>
+          </a:p>
+          <a:p>
+            <a:r>
+              <a:rPr lang="en-GB" dirty="0"/>
+              <a:t>Increase the longest run by 0.2 mile to boast 3.5 miles length, requiring an additional snow making coverage of 4 acres</a:t>
+            </a:r>
+            <a:endParaRPr lang="en-ZA" dirty="0"/>
+          </a:p>
+        </p:txBody>
+      </p:sp>
+    </p:spTree>
+    <p:extLst>
+      <p:ext uri="{BB962C8B-B14F-4D97-AF65-F5344CB8AC3E}">
+        <p14:creationId xmlns:p14="http://schemas.microsoft.com/office/powerpoint/2010/main" val="1837157271"/>
+      </p:ext>
+    </p:extLst>
+  </p:cSld>
+  <p:clrMapOvr>
+    <a:masterClrMapping/>
+  </p:clrMapOvr>
+</p:sld>
+</file>
+
+<file path=ppt/slides/slide6.xml><?xml version="1.0" encoding="utf-8"?>
+<p:sld xmlns:a="http://schemas.openxmlformats.org/drawingml/2006/main" xmlns:r="http://schemas.openxmlformats.org/officeDocument/2006/relationships" xmlns:p="http://schemas.openxmlformats.org/presentationml/2006/main">
+  <p:cSld>
+    <p:spTree>
+      <p:nvGrpSpPr>
+        <p:cNvPr id="1" name=""/>
+        <p:cNvGrpSpPr/>
+        <p:nvPr/>
+      </p:nvGrpSpPr>
+      <p:grpSpPr>
+        <a:xfrm>
+          <a:off x="0" y="0"/>
+          <a:ext cx="0" cy="0"/>
+          <a:chOff x="0" y="0"/>
+          <a:chExt cx="0" cy="0"/>
+        </a:xfrm>
+      </p:grpSpPr>
+      <p:sp>
+        <p:nvSpPr>
+          <p:cNvPr id="2" name="Title 1">
+            <a:extLst>
+              <a:ext uri="{FF2B5EF4-FFF2-40B4-BE49-F238E27FC236}">
+                <a16:creationId xmlns:a16="http://schemas.microsoft.com/office/drawing/2014/main" id="{1A590FAE-EF88-41B3-88A1-FB784AD4CC7C}"/>
+              </a:ext>
+            </a:extLst>
+          </p:cNvPr>
+          <p:cNvSpPr>
+            <a:spLocks noGrp="1"/>
+          </p:cNvSpPr>
+          <p:nvPr>
+            <p:ph type="title"/>
+          </p:nvPr>
+        </p:nvSpPr>
+        <p:spPr/>
+        <p:txBody>
+          <a:bodyPr/>
+          <a:lstStyle/>
+          <a:p>
+            <a:r>
+              <a:rPr lang="en-GB" dirty="0"/>
+              <a:t>Modelling Results and Analysis</a:t>
+            </a:r>
+            <a:endParaRPr lang="en-ZA" dirty="0"/>
+          </a:p>
+        </p:txBody>
+      </p:sp>
+      <p:sp>
+        <p:nvSpPr>
+          <p:cNvPr id="3" name="Content Placeholder 2">
+            <a:extLst>
+              <a:ext uri="{FF2B5EF4-FFF2-40B4-BE49-F238E27FC236}">
+                <a16:creationId xmlns:a16="http://schemas.microsoft.com/office/drawing/2014/main" id="{29E1F064-6F66-4685-B2DD-4D82354DC75E}"/>
+              </a:ext>
+            </a:extLst>
+          </p:cNvPr>
+          <p:cNvSpPr>
+            <a:spLocks noGrp="1"/>
+          </p:cNvSpPr>
+          <p:nvPr>
+            <p:ph idx="1"/>
+          </p:nvPr>
+        </p:nvSpPr>
+        <p:spPr/>
+        <p:txBody>
+          <a:bodyPr/>
+          <a:lstStyle/>
+          <a:p>
+            <a:r>
+              <a:rPr lang="en-GB" dirty="0"/>
+              <a:t>As expected, the features with high impact on ticket price needed a lower percentage change to change the ticket price.</a:t>
+            </a:r>
+            <a:endParaRPr lang="en-ZA" dirty="0"/>
+          </a:p>
+        </p:txBody>
+      </p:sp>
+    </p:spTree>
+    <p:extLst>
+      <p:ext uri="{BB962C8B-B14F-4D97-AF65-F5344CB8AC3E}">
+        <p14:creationId xmlns:p14="http://schemas.microsoft.com/office/powerpoint/2010/main" val="957862531"/>
+      </p:ext>
+    </p:extLst>
+  </p:cSld>
+  <p:clrMapOvr>
+    <a:masterClrMapping/>
+  </p:clrMapOvr>
+</p:sld>
+</file>
+
+<file path=ppt/slides/slide7.xml><?xml version="1.0" encoding="utf-8"?>
+<p:sld xmlns:a="http://schemas.openxmlformats.org/drawingml/2006/main" xmlns:r="http://schemas.openxmlformats.org/officeDocument/2006/relationships" xmlns:p="http://schemas.openxmlformats.org/presentationml/2006/main">
+  <p:cSld>
+    <p:spTree>
+      <p:nvGrpSpPr>
+        <p:cNvPr id="1" name=""/>
+        <p:cNvGrpSpPr/>
+        <p:nvPr/>
+      </p:nvGrpSpPr>
+      <p:grpSpPr>
+        <a:xfrm>
+          <a:off x="0" y="0"/>
+          <a:ext cx="0" cy="0"/>
+          <a:chOff x="0" y="0"/>
+          <a:chExt cx="0" cy="0"/>
+        </a:xfrm>
+      </p:grpSpPr>
+      <p:sp>
+        <p:nvSpPr>
+          <p:cNvPr id="2" name="Title 1">
+            <a:extLst>
+              <a:ext uri="{FF2B5EF4-FFF2-40B4-BE49-F238E27FC236}">
                 <a16:creationId xmlns:a16="http://schemas.microsoft.com/office/drawing/2014/main" id="{BC95CBBB-FE15-44B7-8A3A-E9326D9ED811}"/>
               </a:ext>
             </a:extLst>
@@ -3784,7 +4017,21 @@
           <a:bodyPr/>
           <a:lstStyle/>
           <a:p>
-            <a:endParaRPr lang="en-ZA"/>
+            <a:r>
+              <a:rPr lang="en-GB" dirty="0"/>
+              <a:t>The exercise was a success since the model that was developed performed significantly better than simply predicting based on average ticket price for all ski resorts.</a:t>
+            </a:r>
+          </a:p>
+          <a:p>
+            <a:r>
+              <a:rPr lang="en-GB" dirty="0"/>
+              <a:t>The model will also help guide decision makers on how to select the correct features to procure or drop in the future. They can make these decision based on whether the model predicts that they will make a loss </a:t>
+            </a:r>
+            <a:r>
+              <a:rPr lang="en-GB"/>
+              <a:t>or optimal profits.</a:t>
+            </a:r>
+            <a:endParaRPr lang="en-ZA" dirty="0"/>
           </a:p>
         </p:txBody>
       </p:sp>

</xml_diff>